<commit_message>
Adicionado no plano de teste do grupo em edição
</commit_message>
<xml_diff>
--- a/Documentacao/apresentacao_fabrica_de_software_ADS4.pptx
+++ b/Documentacao/apresentacao_fabrica_de_software_ADS4.pptx
@@ -204,7 +204,7 @@
           <a:p>
             <a:fld id="{85DB6F77-31B3-44A6-9538-7D3B84B14A3E}" type="datetimeFigureOut">
               <a:rPr lang="en-US" smtClean="0"/>
-              <a:t>2/24/2021</a:t>
+              <a:t>2/25/2021</a:t>
             </a:fld>
             <a:endParaRPr lang="en-US" dirty="0"/>
           </a:p>
@@ -697,7 +697,7 @@
           <a:p>
             <a:fld id="{F7B24132-C908-474C-84C6-F33F0E9C2824}" type="datetime1">
               <a:rPr lang="en-US" smtClean="0"/>
-              <a:t>2/24/2021</a:t>
+              <a:t>2/25/2021</a:t>
             </a:fld>
             <a:endParaRPr lang="en-US" dirty="0"/>
           </a:p>
@@ -900,7 +900,7 @@
           <a:p>
             <a:fld id="{03A0D6BE-6A5B-4B1A-AB35-D5FFCCF5138B}" type="datetime1">
               <a:rPr lang="en-US" smtClean="0"/>
-              <a:t>2/24/2021</a:t>
+              <a:t>2/25/2021</a:t>
             </a:fld>
             <a:endParaRPr lang="en-US" dirty="0"/>
           </a:p>
@@ -1151,7 +1151,7 @@
           <a:p>
             <a:fld id="{F4E8BD5B-87CC-4318-9824-F4CA83CB0BAF}" type="datetime1">
               <a:rPr lang="en-US" smtClean="0"/>
-              <a:t>2/24/2021</a:t>
+              <a:t>2/25/2021</a:t>
             </a:fld>
             <a:endParaRPr lang="en-US" dirty="0"/>
           </a:p>
@@ -1320,7 +1320,7 @@
           <a:p>
             <a:fld id="{F5E2AA5E-62DB-4209-84D2-A3A9C66875BD}" type="datetime1">
               <a:rPr lang="en-US" smtClean="0"/>
-              <a:t>2/24/2021</a:t>
+              <a:t>2/25/2021</a:t>
             </a:fld>
             <a:endParaRPr lang="en-US" dirty="0"/>
           </a:p>
@@ -1658,7 +1658,7 @@
           <a:p>
             <a:fld id="{55B8EF27-61CD-4273-9CC6-8B5AB469D6E9}" type="datetime1">
               <a:rPr lang="en-US" smtClean="0"/>
-              <a:t>2/24/2021</a:t>
+              <a:t>2/25/2021</a:t>
             </a:fld>
             <a:endParaRPr lang="en-US" dirty="0"/>
           </a:p>
@@ -1928,7 +1928,7 @@
           <a:p>
             <a:fld id="{F0614D88-E4A3-4915-A946-C7B143E0147E}" type="datetime1">
               <a:rPr lang="en-US" smtClean="0"/>
-              <a:t>2/24/2021</a:t>
+              <a:t>2/25/2021</a:t>
             </a:fld>
             <a:endParaRPr lang="en-US" dirty="0"/>
           </a:p>
@@ -2302,7 +2302,7 @@
           <a:p>
             <a:fld id="{07C41193-F002-4F22-ACB4-105512D85B33}" type="datetime1">
               <a:rPr lang="en-US" smtClean="0"/>
-              <a:t>2/24/2021</a:t>
+              <a:t>2/25/2021</a:t>
             </a:fld>
             <a:endParaRPr lang="en-US" dirty="0"/>
           </a:p>
@@ -2415,7 +2415,7 @@
           <a:p>
             <a:fld id="{03B2B57F-0B3C-4FE7-8F56-8C4115027F2E}" type="datetime1">
               <a:rPr lang="en-US" smtClean="0"/>
-              <a:t>2/24/2021</a:t>
+              <a:t>2/25/2021</a:t>
             </a:fld>
             <a:endParaRPr lang="en-US" dirty="0"/>
           </a:p>
@@ -2581,7 +2581,7 @@
           <a:p>
             <a:fld id="{70E8098D-3BCA-4496-B67F-08ABED3A79F9}" type="datetime1">
               <a:rPr lang="en-US" smtClean="0"/>
-              <a:t>2/24/2021</a:t>
+              <a:t>2/25/2021</a:t>
             </a:fld>
             <a:endParaRPr lang="en-US" dirty="0"/>
           </a:p>
@@ -2931,7 +2931,7 @@
           <a:p>
             <a:fld id="{5F4F9A14-79CD-4DBB-8A95-93FAB90953CE}" type="datetime1">
               <a:rPr lang="en-US" smtClean="0"/>
-              <a:t>2/24/2021</a:t>
+              <a:t>2/25/2021</a:t>
             </a:fld>
             <a:endParaRPr lang="en-US" dirty="0"/>
           </a:p>
@@ -3309,7 +3309,7 @@
           <a:p>
             <a:fld id="{72FCCA62-85F4-4E91-8034-B3A4AEB2ACA5}" type="datetime1">
               <a:rPr lang="en-US" smtClean="0"/>
-              <a:t>2/24/2021</a:t>
+              <a:t>2/25/2021</a:t>
             </a:fld>
             <a:endParaRPr lang="en-US" dirty="0"/>
           </a:p>
@@ -3591,7 +3591,7 @@
           <a:p>
             <a:fld id="{77739FE2-C7BB-439D-8EFA-EB059A6AF0B6}" type="datetime1">
               <a:rPr lang="en-US" smtClean="0"/>
-              <a:t>2/24/2021</a:t>
+              <a:t>2/25/2021</a:t>
             </a:fld>
             <a:endParaRPr lang="en-US" dirty="0"/>
           </a:p>
@@ -8016,7 +8016,7 @@
                   <a:srgbClr val="FFFFFF"/>
                 </a:solidFill>
               </a:rPr>
-              <a:t>Usuário</a:t>
+              <a:t>Administração</a:t>
             </a:r>
             <a:r>
               <a:rPr lang="en-US" sz="2200" cap="none" dirty="0">
@@ -8024,7 +8024,7 @@
                   <a:srgbClr val="FFFFFF"/>
                 </a:solidFill>
               </a:rPr>
-              <a:t> de </a:t>
+              <a:t> dos </a:t>
             </a:r>
             <a:r>
               <a:rPr lang="en-US" sz="2200" cap="none" dirty="0" err="1">
@@ -8032,7 +8032,23 @@
                   <a:srgbClr val="FFFFFF"/>
                 </a:solidFill>
               </a:rPr>
-              <a:t>cadastro</a:t>
+              <a:t>usuários</a:t>
+            </a:r>
+            <a:r>
+              <a:rPr lang="en-US" sz="2200" cap="none" dirty="0">
+                <a:solidFill>
+                  <a:srgbClr val="FFFFFF"/>
+                </a:solidFill>
+              </a:rPr>
+              <a:t> </a:t>
+            </a:r>
+            <a:r>
+              <a:rPr lang="en-US" sz="2200" cap="none" dirty="0" err="1">
+                <a:solidFill>
+                  <a:srgbClr val="FFFFFF"/>
+                </a:solidFill>
+              </a:rPr>
+              <a:t>cadastrados</a:t>
             </a:r>
             <a:endParaRPr lang="en-US" sz="2200" cap="none" dirty="0">
               <a:solidFill>
@@ -8057,7 +8073,7 @@
                   <a:srgbClr val="FFFFFF"/>
                 </a:solidFill>
               </a:rPr>
-              <a:t>Manutenção</a:t>
+              <a:t>Administração</a:t>
             </a:r>
             <a:r>
               <a:rPr lang="en-US" sz="2200" cap="none" dirty="0">
@@ -8065,23 +8081,7 @@
                   <a:srgbClr val="FFFFFF"/>
                 </a:solidFill>
               </a:rPr>
-              <a:t> </a:t>
-            </a:r>
-            <a:r>
-              <a:rPr lang="en-US" sz="2200" cap="none" dirty="0" err="1">
-                <a:solidFill>
-                  <a:srgbClr val="FFFFFF"/>
-                </a:solidFill>
-              </a:rPr>
-              <a:t>nos</a:t>
-            </a:r>
-            <a:r>
-              <a:rPr lang="en-US" sz="2200" cap="none" dirty="0">
-                <a:solidFill>
-                  <a:srgbClr val="FFFFFF"/>
-                </a:solidFill>
-              </a:rPr>
-              <a:t> </a:t>
+              <a:t> dos </a:t>
             </a:r>
             <a:r>
               <a:rPr lang="en-US" sz="2200" cap="none" dirty="0" err="1">
@@ -8100,149 +8100,12 @@
               <a:t> de </a:t>
             </a:r>
             <a:r>
-              <a:rPr lang="en-US" sz="2200" cap="none" dirty="0" err="1">
+              <a:rPr lang="en-US" sz="2200" cap="none">
                 <a:solidFill>
                   <a:srgbClr val="FFFFFF"/>
                 </a:solidFill>
               </a:rPr>
-              <a:t>usuários</a:t>
-            </a:r>
-            <a:r>
-              <a:rPr lang="en-US" sz="2200" cap="none" dirty="0">
-                <a:solidFill>
-                  <a:srgbClr val="FFFFFF"/>
-                </a:solidFill>
-              </a:rPr>
-              <a:t>, </a:t>
-            </a:r>
-            <a:r>
-              <a:rPr lang="en-US" sz="2200" cap="none" dirty="0" err="1">
-                <a:solidFill>
-                  <a:srgbClr val="FFFFFF"/>
-                </a:solidFill>
-              </a:rPr>
-              <a:t>imóveis</a:t>
-            </a:r>
-            <a:r>
-              <a:rPr lang="en-US" sz="2200" cap="none" dirty="0">
-                <a:solidFill>
-                  <a:srgbClr val="FFFFFF"/>
-                </a:solidFill>
-              </a:rPr>
-              <a:t>, </a:t>
-            </a:r>
-            <a:r>
-              <a:rPr lang="en-US" sz="2200" cap="none" dirty="0" err="1">
-                <a:solidFill>
-                  <a:srgbClr val="FFFFFF"/>
-                </a:solidFill>
-              </a:rPr>
-              <a:t>formularios</a:t>
-            </a:r>
-            <a:r>
-              <a:rPr lang="en-US" sz="2200" cap="none" dirty="0">
-                <a:solidFill>
-                  <a:srgbClr val="FFFFFF"/>
-                </a:solidFill>
-              </a:rPr>
-              <a:t> e </a:t>
-            </a:r>
-            <a:r>
-              <a:rPr lang="en-US" sz="2200" cap="none" dirty="0" err="1">
-                <a:solidFill>
-                  <a:srgbClr val="FFFFFF"/>
-                </a:solidFill>
-              </a:rPr>
-              <a:t>fotos</a:t>
-            </a:r>
-            <a:endParaRPr lang="en-US" sz="2200" cap="none" dirty="0">
-              <a:solidFill>
-                <a:srgbClr val="FFFFFF"/>
-              </a:solidFill>
-            </a:endParaRPr>
-          </a:p>
-          <a:p>
-            <a:pPr marL="342900" indent="-342900">
-              <a:spcBef>
-                <a:spcPts val="50"/>
-              </a:spcBef>
-              <a:spcAft>
-                <a:spcPts val="50"/>
-              </a:spcAft>
-              <a:buFont typeface="Wingdings" panose="05000000000000000000" pitchFamily="2" charset="2"/>
-              <a:buChar char="§"/>
-            </a:pPr>
-            <a:r>
-              <a:rPr lang="en-US" cap="none" dirty="0" err="1">
-                <a:solidFill>
-                  <a:srgbClr val="FFFFFF"/>
-                </a:solidFill>
-              </a:rPr>
-              <a:t>Listagem</a:t>
-            </a:r>
-            <a:r>
-              <a:rPr lang="en-US" cap="none" dirty="0">
-                <a:solidFill>
-                  <a:srgbClr val="FFFFFF"/>
-                </a:solidFill>
-              </a:rPr>
-              <a:t> de </a:t>
-            </a:r>
-            <a:r>
-              <a:rPr lang="en-US" cap="none" dirty="0" err="1">
-                <a:solidFill>
-                  <a:srgbClr val="FFFFFF"/>
-                </a:solidFill>
-              </a:rPr>
-              <a:t>usuário</a:t>
-            </a:r>
-            <a:r>
-              <a:rPr lang="en-US" cap="none" dirty="0">
-                <a:solidFill>
-                  <a:srgbClr val="FFFFFF"/>
-                </a:solidFill>
-              </a:rPr>
-              <a:t>, </a:t>
-            </a:r>
-            <a:r>
-              <a:rPr lang="en-US" cap="none" dirty="0" err="1">
-                <a:solidFill>
-                  <a:srgbClr val="FFFFFF"/>
-                </a:solidFill>
-              </a:rPr>
-              <a:t>imóveis</a:t>
-            </a:r>
-            <a:r>
-              <a:rPr lang="en-US" cap="none" dirty="0">
-                <a:solidFill>
-                  <a:srgbClr val="FFFFFF"/>
-                </a:solidFill>
-              </a:rPr>
-              <a:t>, </a:t>
-            </a:r>
-            <a:r>
-              <a:rPr lang="en-US" cap="none" dirty="0" err="1">
-                <a:solidFill>
-                  <a:srgbClr val="FFFFFF"/>
-                </a:solidFill>
-              </a:rPr>
-              <a:t>formulários</a:t>
-            </a:r>
-            <a:r>
-              <a:rPr lang="en-US" cap="none" dirty="0">
-                <a:solidFill>
-                  <a:srgbClr val="FFFFFF"/>
-                </a:solidFill>
-              </a:rPr>
-              <a:t> e </a:t>
-            </a:r>
-            <a:r>
-              <a:rPr lang="en-US" cap="none" dirty="0" err="1">
-                <a:solidFill>
-                  <a:srgbClr val="FFFFFF"/>
-                </a:solidFill>
-              </a:rPr>
-              <a:t>fotos</a:t>
+              <a:t>anúncios</a:t>
             </a:r>
             <a:endParaRPr lang="en-US" cap="none" dirty="0">
               <a:solidFill>
@@ -8558,70 +8421,6 @@
                                           <p:spTgt spid="3">
                                             <p:txEl>
                                               <p:pRg st="1" end="1"/>
-                                            </p:txEl>
-                                          </p:spTgt>
-                                        </p:tgtEl>
-                                      </p:cBhvr>
-                                    </p:animEffect>
-                                  </p:childTnLst>
-                                </p:cTn>
-                              </p:par>
-                            </p:childTnLst>
-                          </p:cTn>
-                        </p:par>
-                      </p:childTnLst>
-                    </p:cTn>
-                  </p:par>
-                  <p:par>
-                    <p:cTn id="13" fill="hold">
-                      <p:stCondLst>
-                        <p:cond delay="indefinite"/>
-                      </p:stCondLst>
-                      <p:childTnLst>
-                        <p:par>
-                          <p:cTn id="14" fill="hold">
-                            <p:stCondLst>
-                              <p:cond delay="0"/>
-                            </p:stCondLst>
-                            <p:childTnLst>
-                              <p:par>
-                                <p:cTn id="15" presetID="10" presetClass="entr" presetSubtype="0" fill="hold" grpId="0" nodeType="clickEffect">
-                                  <p:stCondLst>
-                                    <p:cond delay="1500"/>
-                                  </p:stCondLst>
-                                  <p:iterate>
-                                    <p:tmPct val="10000"/>
-                                  </p:iterate>
-                                  <p:childTnLst>
-                                    <p:set>
-                                      <p:cBhvr>
-                                        <p:cTn id="16" dur="1" fill="hold">
-                                          <p:stCondLst>
-                                            <p:cond delay="0"/>
-                                          </p:stCondLst>
-                                        </p:cTn>
-                                        <p:tgtEl>
-                                          <p:spTgt spid="3">
-                                            <p:txEl>
-                                              <p:pRg st="2" end="2"/>
-                                            </p:txEl>
-                                          </p:spTgt>
-                                        </p:tgtEl>
-                                        <p:attrNameLst>
-                                          <p:attrName>style.visibility</p:attrName>
-                                        </p:attrNameLst>
-                                      </p:cBhvr>
-                                      <p:to>
-                                        <p:strVal val="visible"/>
-                                      </p:to>
-                                    </p:set>
-                                    <p:animEffect transition="in" filter="fade">
-                                      <p:cBhvr>
-                                        <p:cTn id="17" dur="700"/>
-                                        <p:tgtEl>
-                                          <p:spTgt spid="3">
-                                            <p:txEl>
-                                              <p:pRg st="2" end="2"/>
                                             </p:txEl>
                                           </p:spTgt>
                                         </p:tgtEl>
@@ -9697,12 +9496,11 @@
 </file>
 
 <file path=customXml/item1.xml><?xml version="1.0" encoding="utf-8"?>
-<?mso-contentType ?>
-<FormTemplates xmlns="http://schemas.microsoft.com/sharepoint/v3/contenttype/forms">
-  <Display>DocumentLibraryForm</Display>
-  <Edit>DocumentLibraryForm</Edit>
-  <New>DocumentLibraryForm</New>
-</FormTemplates>
+<p:properties xmlns:p="http://schemas.microsoft.com/office/2006/metadata/properties" xmlns:xsi="http://www.w3.org/2001/XMLSchema-instance" xmlns:pc="http://schemas.microsoft.com/office/infopath/2007/PartnerControls">
+  <documentManagement>
+    <MediaServiceKeyPoints xmlns="71af3243-3dd4-4a8d-8c0d-dd76da1f02a5" xsi:nil="true"/>
+  </documentManagement>
+</p:properties>
 </file>
 
 <file path=customXml/item2.xml><?xml version="1.0" encoding="utf-8"?>
@@ -9917,17 +9715,20 @@
 </file>
 
 <file path=customXml/item3.xml><?xml version="1.0" encoding="utf-8"?>
-<p:properties xmlns:p="http://schemas.microsoft.com/office/2006/metadata/properties" xmlns:xsi="http://www.w3.org/2001/XMLSchema-instance" xmlns:pc="http://schemas.microsoft.com/office/infopath/2007/PartnerControls">
-  <documentManagement>
-    <MediaServiceKeyPoints xmlns="71af3243-3dd4-4a8d-8c0d-dd76da1f02a5" xsi:nil="true"/>
-  </documentManagement>
-</p:properties>
+<?mso-contentType ?>
+<FormTemplates xmlns="http://schemas.microsoft.com/sharepoint/v3/contenttype/forms">
+  <Display>DocumentLibraryForm</Display>
+  <Edit>DocumentLibraryForm</Edit>
+  <New>DocumentLibraryForm</New>
+</FormTemplates>
 </file>
 
 <file path=customXml/itemProps1.xml><?xml version="1.0" encoding="utf-8"?>
-<ds:datastoreItem xmlns:ds="http://schemas.openxmlformats.org/officeDocument/2006/customXml" ds:itemID="{D226911E-AE6C-4963-864C-FEDEB2DC7729}">
+<ds:datastoreItem xmlns:ds="http://schemas.openxmlformats.org/officeDocument/2006/customXml" ds:itemID="{B05550B3-F1C0-4D73-82FC-DDABEC8F0952}">
   <ds:schemaRefs>
-    <ds:schemaRef ds:uri="http://schemas.microsoft.com/sharepoint/v3/contenttype/forms"/>
+    <ds:schemaRef ds:uri="http://schemas.microsoft.com/office/2006/metadata/properties"/>
+    <ds:schemaRef ds:uri="http://schemas.microsoft.com/office/infopath/2007/PartnerControls"/>
+    <ds:schemaRef ds:uri="71af3243-3dd4-4a8d-8c0d-dd76da1f02a5"/>
   </ds:schemaRefs>
 </ds:datastoreItem>
 </file>
@@ -9952,11 +9753,9 @@
 </file>
 
 <file path=customXml/itemProps3.xml><?xml version="1.0" encoding="utf-8"?>
-<ds:datastoreItem xmlns:ds="http://schemas.openxmlformats.org/officeDocument/2006/customXml" ds:itemID="{B05550B3-F1C0-4D73-82FC-DDABEC8F0952}">
+<ds:datastoreItem xmlns:ds="http://schemas.openxmlformats.org/officeDocument/2006/customXml" ds:itemID="{D226911E-AE6C-4963-864C-FEDEB2DC7729}">
   <ds:schemaRefs>
-    <ds:schemaRef ds:uri="http://schemas.microsoft.com/office/2006/metadata/properties"/>
-    <ds:schemaRef ds:uri="http://schemas.microsoft.com/office/infopath/2007/PartnerControls"/>
-    <ds:schemaRef ds:uri="71af3243-3dd4-4a8d-8c0d-dd76da1f02a5"/>
+    <ds:schemaRef ds:uri="http://schemas.microsoft.com/sharepoint/v3/contenttype/forms"/>
   </ds:schemaRefs>
 </ds:datastoreItem>
 </file>
</xml_diff>